<commit_message>
Correction image of transmittance in Readme.md
</commit_message>
<xml_diff>
--- a/Uterine_Cervix_red_Tagged.pptx
+++ b/Uterine_Cervix_red_Tagged.pptx
@@ -246,7 +246,7 @@
           <a:p>
             <a:fld id="{5409B3F7-34D6-439C-8BDC-BB5DF116BF20}" type="datetimeFigureOut">
               <a:rPr lang="en-US" smtClean="0"/>
-              <a:t>9/16/2020</a:t>
+              <a:t>2/19/2021</a:t>
             </a:fld>
             <a:endParaRPr lang="en-US"/>
           </a:p>
@@ -416,7 +416,7 @@
           <a:p>
             <a:fld id="{5409B3F7-34D6-439C-8BDC-BB5DF116BF20}" type="datetimeFigureOut">
               <a:rPr lang="en-US" smtClean="0"/>
-              <a:t>9/16/2020</a:t>
+              <a:t>2/19/2021</a:t>
             </a:fld>
             <a:endParaRPr lang="en-US"/>
           </a:p>
@@ -596,7 +596,7 @@
           <a:p>
             <a:fld id="{5409B3F7-34D6-439C-8BDC-BB5DF116BF20}" type="datetimeFigureOut">
               <a:rPr lang="en-US" smtClean="0"/>
-              <a:t>9/16/2020</a:t>
+              <a:t>2/19/2021</a:t>
             </a:fld>
             <a:endParaRPr lang="en-US"/>
           </a:p>
@@ -766,7 +766,7 @@
           <a:p>
             <a:fld id="{5409B3F7-34D6-439C-8BDC-BB5DF116BF20}" type="datetimeFigureOut">
               <a:rPr lang="en-US" smtClean="0"/>
-              <a:t>9/16/2020</a:t>
+              <a:t>2/19/2021</a:t>
             </a:fld>
             <a:endParaRPr lang="en-US"/>
           </a:p>
@@ -1012,7 +1012,7 @@
           <a:p>
             <a:fld id="{5409B3F7-34D6-439C-8BDC-BB5DF116BF20}" type="datetimeFigureOut">
               <a:rPr lang="en-US" smtClean="0"/>
-              <a:t>9/16/2020</a:t>
+              <a:t>2/19/2021</a:t>
             </a:fld>
             <a:endParaRPr lang="en-US"/>
           </a:p>
@@ -1244,7 +1244,7 @@
           <a:p>
             <a:fld id="{5409B3F7-34D6-439C-8BDC-BB5DF116BF20}" type="datetimeFigureOut">
               <a:rPr lang="en-US" smtClean="0"/>
-              <a:t>9/16/2020</a:t>
+              <a:t>2/19/2021</a:t>
             </a:fld>
             <a:endParaRPr lang="en-US"/>
           </a:p>
@@ -1611,7 +1611,7 @@
           <a:p>
             <a:fld id="{5409B3F7-34D6-439C-8BDC-BB5DF116BF20}" type="datetimeFigureOut">
               <a:rPr lang="en-US" smtClean="0"/>
-              <a:t>9/16/2020</a:t>
+              <a:t>2/19/2021</a:t>
             </a:fld>
             <a:endParaRPr lang="en-US"/>
           </a:p>
@@ -1729,7 +1729,7 @@
           <a:p>
             <a:fld id="{5409B3F7-34D6-439C-8BDC-BB5DF116BF20}" type="datetimeFigureOut">
               <a:rPr lang="en-US" smtClean="0"/>
-              <a:t>9/16/2020</a:t>
+              <a:t>2/19/2021</a:t>
             </a:fld>
             <a:endParaRPr lang="en-US"/>
           </a:p>
@@ -1824,7 +1824,7 @@
           <a:p>
             <a:fld id="{5409B3F7-34D6-439C-8BDC-BB5DF116BF20}" type="datetimeFigureOut">
               <a:rPr lang="en-US" smtClean="0"/>
-              <a:t>9/16/2020</a:t>
+              <a:t>2/19/2021</a:t>
             </a:fld>
             <a:endParaRPr lang="en-US"/>
           </a:p>
@@ -2101,7 +2101,7 @@
           <a:p>
             <a:fld id="{5409B3F7-34D6-439C-8BDC-BB5DF116BF20}" type="datetimeFigureOut">
               <a:rPr lang="en-US" smtClean="0"/>
-              <a:t>9/16/2020</a:t>
+              <a:t>2/19/2021</a:t>
             </a:fld>
             <a:endParaRPr lang="en-US"/>
           </a:p>
@@ -2354,7 +2354,7 @@
           <a:p>
             <a:fld id="{5409B3F7-34D6-439C-8BDC-BB5DF116BF20}" type="datetimeFigureOut">
               <a:rPr lang="en-US" smtClean="0"/>
-              <a:t>9/16/2020</a:t>
+              <a:t>2/19/2021</a:t>
             </a:fld>
             <a:endParaRPr lang="en-US"/>
           </a:p>
@@ -2567,7 +2567,7 @@
           <a:p>
             <a:fld id="{5409B3F7-34D6-439C-8BDC-BB5DF116BF20}" type="datetimeFigureOut">
               <a:rPr lang="en-US" smtClean="0"/>
-              <a:t>9/16/2020</a:t>
+              <a:t>2/19/2021</a:t>
             </a:fld>
             <a:endParaRPr lang="en-US"/>
           </a:p>
@@ -3355,7 +3355,7 @@
         <p:spPr>
           <a:xfrm>
             <a:off x="1236639" y="1907988"/>
-            <a:ext cx="3733333" cy="2800000"/>
+            <a:ext cx="3733333" cy="2799999"/>
           </a:xfrm>
         </p:spPr>
       </p:pic>
@@ -3382,7 +3382,7 @@
         <p:spPr>
           <a:xfrm>
             <a:off x="4969972" y="1907988"/>
-            <a:ext cx="3733333" cy="2800000"/>
+            <a:ext cx="3733333" cy="2799999"/>
           </a:xfrm>
           <a:prstGeom prst="rect">
             <a:avLst/>

</xml_diff>

<commit_message>
Remove 380 nm band
</commit_message>
<xml_diff>
--- a/Uterine_Cervix_red_Tagged.pptx
+++ b/Uterine_Cervix_red_Tagged.pptx
@@ -246,7 +246,7 @@
           <a:p>
             <a:fld id="{5409B3F7-34D6-439C-8BDC-BB5DF116BF20}" type="datetimeFigureOut">
               <a:rPr lang="en-US" smtClean="0"/>
-              <a:t>2/19/2021</a:t>
+              <a:t>2/22/2021</a:t>
             </a:fld>
             <a:endParaRPr lang="en-US"/>
           </a:p>
@@ -416,7 +416,7 @@
           <a:p>
             <a:fld id="{5409B3F7-34D6-439C-8BDC-BB5DF116BF20}" type="datetimeFigureOut">
               <a:rPr lang="en-US" smtClean="0"/>
-              <a:t>2/19/2021</a:t>
+              <a:t>2/22/2021</a:t>
             </a:fld>
             <a:endParaRPr lang="en-US"/>
           </a:p>
@@ -596,7 +596,7 @@
           <a:p>
             <a:fld id="{5409B3F7-34D6-439C-8BDC-BB5DF116BF20}" type="datetimeFigureOut">
               <a:rPr lang="en-US" smtClean="0"/>
-              <a:t>2/19/2021</a:t>
+              <a:t>2/22/2021</a:t>
             </a:fld>
             <a:endParaRPr lang="en-US"/>
           </a:p>
@@ -766,7 +766,7 @@
           <a:p>
             <a:fld id="{5409B3F7-34D6-439C-8BDC-BB5DF116BF20}" type="datetimeFigureOut">
               <a:rPr lang="en-US" smtClean="0"/>
-              <a:t>2/19/2021</a:t>
+              <a:t>2/22/2021</a:t>
             </a:fld>
             <a:endParaRPr lang="en-US"/>
           </a:p>
@@ -1012,7 +1012,7 @@
           <a:p>
             <a:fld id="{5409B3F7-34D6-439C-8BDC-BB5DF116BF20}" type="datetimeFigureOut">
               <a:rPr lang="en-US" smtClean="0"/>
-              <a:t>2/19/2021</a:t>
+              <a:t>2/22/2021</a:t>
             </a:fld>
             <a:endParaRPr lang="en-US"/>
           </a:p>
@@ -1244,7 +1244,7 @@
           <a:p>
             <a:fld id="{5409B3F7-34D6-439C-8BDC-BB5DF116BF20}" type="datetimeFigureOut">
               <a:rPr lang="en-US" smtClean="0"/>
-              <a:t>2/19/2021</a:t>
+              <a:t>2/22/2021</a:t>
             </a:fld>
             <a:endParaRPr lang="en-US"/>
           </a:p>
@@ -1611,7 +1611,7 @@
           <a:p>
             <a:fld id="{5409B3F7-34D6-439C-8BDC-BB5DF116BF20}" type="datetimeFigureOut">
               <a:rPr lang="en-US" smtClean="0"/>
-              <a:t>2/19/2021</a:t>
+              <a:t>2/22/2021</a:t>
             </a:fld>
             <a:endParaRPr lang="en-US"/>
           </a:p>
@@ -1729,7 +1729,7 @@
           <a:p>
             <a:fld id="{5409B3F7-34D6-439C-8BDC-BB5DF116BF20}" type="datetimeFigureOut">
               <a:rPr lang="en-US" smtClean="0"/>
-              <a:t>2/19/2021</a:t>
+              <a:t>2/22/2021</a:t>
             </a:fld>
             <a:endParaRPr lang="en-US"/>
           </a:p>
@@ -1824,7 +1824,7 @@
           <a:p>
             <a:fld id="{5409B3F7-34D6-439C-8BDC-BB5DF116BF20}" type="datetimeFigureOut">
               <a:rPr lang="en-US" smtClean="0"/>
-              <a:t>2/19/2021</a:t>
+              <a:t>2/22/2021</a:t>
             </a:fld>
             <a:endParaRPr lang="en-US"/>
           </a:p>
@@ -2101,7 +2101,7 @@
           <a:p>
             <a:fld id="{5409B3F7-34D6-439C-8BDC-BB5DF116BF20}" type="datetimeFigureOut">
               <a:rPr lang="en-US" smtClean="0"/>
-              <a:t>2/19/2021</a:t>
+              <a:t>2/22/2021</a:t>
             </a:fld>
             <a:endParaRPr lang="en-US"/>
           </a:p>
@@ -2354,7 +2354,7 @@
           <a:p>
             <a:fld id="{5409B3F7-34D6-439C-8BDC-BB5DF116BF20}" type="datetimeFigureOut">
               <a:rPr lang="en-US" smtClean="0"/>
-              <a:t>2/19/2021</a:t>
+              <a:t>2/22/2021</a:t>
             </a:fld>
             <a:endParaRPr lang="en-US"/>
           </a:p>
@@ -2567,7 +2567,7 @@
           <a:p>
             <a:fld id="{5409B3F7-34D6-439C-8BDC-BB5DF116BF20}" type="datetimeFigureOut">
               <a:rPr lang="en-US" smtClean="0"/>
-              <a:t>2/19/2021</a:t>
+              <a:t>2/22/2021</a:t>
             </a:fld>
             <a:endParaRPr lang="en-US"/>
           </a:p>
@@ -3354,8 +3354,8 @@
         </p:blipFill>
         <p:spPr>
           <a:xfrm>
-            <a:off x="1236639" y="1907988"/>
-            <a:ext cx="3733333" cy="2799999"/>
+            <a:off x="1236640" y="1907988"/>
+            <a:ext cx="3733331" cy="2799999"/>
           </a:xfrm>
         </p:spPr>
       </p:pic>
@@ -3381,8 +3381,8 @@
         </p:blipFill>
         <p:spPr>
           <a:xfrm>
-            <a:off x="4969972" y="1907988"/>
-            <a:ext cx="3733333" cy="2799999"/>
+            <a:off x="4969973" y="1907988"/>
+            <a:ext cx="3733331" cy="2799999"/>
           </a:xfrm>
           <a:prstGeom prst="rect">
             <a:avLst/>

</xml_diff>